<commit_message>
Done: rough draft of the rough draft of the poster.
</commit_message>
<xml_diff>
--- a/poster/poster.pptx
+++ b/poster/poster.pptx
@@ -105,6 +105,408 @@
     </a:lvl9pPr>
   </p:defaultTextStyle>
 </p:presentation>
+</file>
+
+<file path=ppt/commentAuthors.xml><?xml version="1.0" encoding="utf-8"?>
+<p:cmAuthorLst xmlns:a="http://schemas.openxmlformats.org/drawingml/2006/main" xmlns:r="http://schemas.openxmlformats.org/officeDocument/2006/relationships" xmlns:p="http://schemas.openxmlformats.org/presentationml/2006/main">
+  <p:cmAuthor id="0" name="kennygao" initials="k" lastIdx="1" clrIdx="0"/>
+</p:cmAuthorLst>
+</file>
+
+<file path=ppt/charts/chart1.xml><?xml version="1.0" encoding="utf-8"?>
+<c:chartSpace xmlns:c="http://schemas.openxmlformats.org/drawingml/2006/chart" xmlns:a="http://schemas.openxmlformats.org/drawingml/2006/main" xmlns:r="http://schemas.openxmlformats.org/officeDocument/2006/relationships">
+  <c:date1904 val="0"/>
+  <c:lang val="en-US"/>
+  <c:roundedCorners val="0"/>
+  <mc:AlternateContent xmlns:mc="http://schemas.openxmlformats.org/markup-compatibility/2006">
+    <mc:Choice xmlns:c14="http://schemas.microsoft.com/office/drawing/2007/8/2/chart" Requires="c14">
+      <c14:style val="102"/>
+    </mc:Choice>
+    <mc:Fallback>
+      <c:style val="2"/>
+    </mc:Fallback>
+  </mc:AlternateContent>
+  <c:chart>
+    <c:title>
+      <c:tx>
+        <c:rich>
+          <a:bodyPr/>
+          <a:lstStyle/>
+          <a:p>
+            <a:pPr>
+              <a:defRPr/>
+            </a:pPr>
+            <a:r>
+              <a:rPr lang="en-US"/>
+              <a:t>Network Usage vs. Conflict Count</a:t>
+            </a:r>
+          </a:p>
+        </c:rich>
+      </c:tx>
+      <c:layout/>
+      <c:overlay val="0"/>
+    </c:title>
+    <c:autoTitleDeleted val="0"/>
+    <c:plotArea>
+      <c:layout/>
+      <c:lineChart>
+        <c:grouping val="standard"/>
+        <c:varyColors val="0"/>
+        <c:ser>
+          <c:idx val="0"/>
+          <c:order val="0"/>
+          <c:tx>
+            <c:strRef>
+              <c:f>Sheet1!$A$1</c:f>
+              <c:strCache>
+                <c:ptCount val="1"/>
+                <c:pt idx="0">
+                  <c:v>naive</c:v>
+                </c:pt>
+              </c:strCache>
+            </c:strRef>
+          </c:tx>
+          <c:marker>
+            <c:symbol val="none"/>
+          </c:marker>
+          <c:val>
+            <c:numRef>
+              <c:f>Sheet1!$A$2:$A$33</c:f>
+              <c:numCache>
+                <c:formatCode>General</c:formatCode>
+                <c:ptCount val="32"/>
+                <c:pt idx="0">
+                  <c:v>1</c:v>
+                </c:pt>
+                <c:pt idx="1">
+                  <c:v>11.53</c:v>
+                </c:pt>
+                <c:pt idx="2">
+                  <c:v>18.43</c:v>
+                </c:pt>
+                <c:pt idx="3">
+                  <c:v>24.16</c:v>
+                </c:pt>
+                <c:pt idx="4">
+                  <c:v>28.28</c:v>
+                </c:pt>
+                <c:pt idx="5">
+                  <c:v>33.15</c:v>
+                </c:pt>
+                <c:pt idx="6">
+                  <c:v>36.96</c:v>
+                </c:pt>
+                <c:pt idx="7">
+                  <c:v>41.22</c:v>
+                </c:pt>
+                <c:pt idx="8">
+                  <c:v>43.2</c:v>
+                </c:pt>
+                <c:pt idx="9">
+                  <c:v>47.2</c:v>
+                </c:pt>
+                <c:pt idx="10">
+                  <c:v>49.35</c:v>
+                </c:pt>
+                <c:pt idx="11">
+                  <c:v>52.25</c:v>
+                </c:pt>
+                <c:pt idx="12">
+                  <c:v>54.2</c:v>
+                </c:pt>
+                <c:pt idx="13">
+                  <c:v>56.98</c:v>
+                </c:pt>
+                <c:pt idx="14">
+                  <c:v>58.6</c:v>
+                </c:pt>
+                <c:pt idx="15">
+                  <c:v>60.19</c:v>
+                </c:pt>
+                <c:pt idx="16">
+                  <c:v>62.64</c:v>
+                </c:pt>
+                <c:pt idx="17">
+                  <c:v>64.41</c:v>
+                </c:pt>
+                <c:pt idx="18">
+                  <c:v>65.5</c:v>
+                </c:pt>
+                <c:pt idx="19">
+                  <c:v>67.59</c:v>
+                </c:pt>
+                <c:pt idx="20">
+                  <c:v>68.75</c:v>
+                </c:pt>
+                <c:pt idx="21">
+                  <c:v>69.86</c:v>
+                </c:pt>
+                <c:pt idx="22">
+                  <c:v>70.64</c:v>
+                </c:pt>
+                <c:pt idx="23">
+                  <c:v>72.02</c:v>
+                </c:pt>
+                <c:pt idx="24">
+                  <c:v>73</c:v>
+                </c:pt>
+                <c:pt idx="25">
+                  <c:v>74.349999999999994</c:v>
+                </c:pt>
+                <c:pt idx="26">
+                  <c:v>75.19</c:v>
+                </c:pt>
+                <c:pt idx="27">
+                  <c:v>76</c:v>
+                </c:pt>
+                <c:pt idx="28">
+                  <c:v>76.5</c:v>
+                </c:pt>
+                <c:pt idx="29">
+                  <c:v>77.099999999999994</c:v>
+                </c:pt>
+                <c:pt idx="30">
+                  <c:v>77.87</c:v>
+                </c:pt>
+                <c:pt idx="31">
+                  <c:v>78.89</c:v>
+                </c:pt>
+              </c:numCache>
+            </c:numRef>
+          </c:val>
+          <c:smooth val="0"/>
+        </c:ser>
+        <c:ser>
+          <c:idx val="1"/>
+          <c:order val="1"/>
+          <c:tx>
+            <c:strRef>
+              <c:f>Sheet1!$B$1</c:f>
+              <c:strCache>
+                <c:ptCount val="1"/>
+                <c:pt idx="0">
+                  <c:v>merkle</c:v>
+                </c:pt>
+              </c:strCache>
+            </c:strRef>
+          </c:tx>
+          <c:marker>
+            <c:symbol val="none"/>
+          </c:marker>
+          <c:val>
+            <c:numRef>
+              <c:f>Sheet1!$B$2:$B$33</c:f>
+              <c:numCache>
+                <c:formatCode>General</c:formatCode>
+                <c:ptCount val="32"/>
+                <c:pt idx="0">
+                  <c:v>32</c:v>
+                </c:pt>
+                <c:pt idx="1">
+                  <c:v>32.53</c:v>
+                </c:pt>
+                <c:pt idx="2">
+                  <c:v>32.99</c:v>
+                </c:pt>
+                <c:pt idx="3">
+                  <c:v>33.619999999999997</c:v>
+                </c:pt>
+                <c:pt idx="4">
+                  <c:v>33.96</c:v>
+                </c:pt>
+                <c:pt idx="5">
+                  <c:v>34.549999999999997</c:v>
+                </c:pt>
+                <c:pt idx="6">
+                  <c:v>34.94</c:v>
+                </c:pt>
+                <c:pt idx="7">
+                  <c:v>35.5</c:v>
+                </c:pt>
+                <c:pt idx="8">
+                  <c:v>35.94</c:v>
+                </c:pt>
+                <c:pt idx="9">
+                  <c:v>36.58</c:v>
+                </c:pt>
+                <c:pt idx="10">
+                  <c:v>37.03</c:v>
+                </c:pt>
+                <c:pt idx="11">
+                  <c:v>37.39</c:v>
+                </c:pt>
+                <c:pt idx="12">
+                  <c:v>38.020000000000003</c:v>
+                </c:pt>
+                <c:pt idx="13">
+                  <c:v>38.92</c:v>
+                </c:pt>
+                <c:pt idx="14">
+                  <c:v>38.799999999999997</c:v>
+                </c:pt>
+                <c:pt idx="15">
+                  <c:v>39.53</c:v>
+                </c:pt>
+                <c:pt idx="16">
+                  <c:v>40.14</c:v>
+                </c:pt>
+                <c:pt idx="17">
+                  <c:v>40.770000000000003</c:v>
+                </c:pt>
+                <c:pt idx="18">
+                  <c:v>40.74</c:v>
+                </c:pt>
+                <c:pt idx="19">
+                  <c:v>41.89</c:v>
+                </c:pt>
+                <c:pt idx="20">
+                  <c:v>42.77</c:v>
+                </c:pt>
+                <c:pt idx="21">
+                  <c:v>42.64</c:v>
+                </c:pt>
+                <c:pt idx="22">
+                  <c:v>42.56</c:v>
+                </c:pt>
+                <c:pt idx="23">
+                  <c:v>43.4</c:v>
+                </c:pt>
+                <c:pt idx="24">
+                  <c:v>43.76</c:v>
+                </c:pt>
+                <c:pt idx="25">
+                  <c:v>44.67</c:v>
+                </c:pt>
+                <c:pt idx="26">
+                  <c:v>45.31</c:v>
+                </c:pt>
+                <c:pt idx="27">
+                  <c:v>45.66</c:v>
+                </c:pt>
+                <c:pt idx="28">
+                  <c:v>45.9</c:v>
+                </c:pt>
+                <c:pt idx="29">
+                  <c:v>46.3</c:v>
+                </c:pt>
+                <c:pt idx="30">
+                  <c:v>46.93</c:v>
+                </c:pt>
+                <c:pt idx="31">
+                  <c:v>47.89</c:v>
+                </c:pt>
+              </c:numCache>
+            </c:numRef>
+          </c:val>
+          <c:smooth val="0"/>
+        </c:ser>
+        <c:dLbls>
+          <c:showLegendKey val="0"/>
+          <c:showVal val="0"/>
+          <c:showCatName val="0"/>
+          <c:showSerName val="0"/>
+          <c:showPercent val="0"/>
+          <c:showBubbleSize val="0"/>
+        </c:dLbls>
+        <c:marker val="1"/>
+        <c:smooth val="0"/>
+        <c:axId val="138565120"/>
+        <c:axId val="154027712"/>
+      </c:lineChart>
+      <c:catAx>
+        <c:axId val="138565120"/>
+        <c:scaling>
+          <c:orientation val="minMax"/>
+        </c:scaling>
+        <c:delete val="0"/>
+        <c:axPos val="b"/>
+        <c:title>
+          <c:tx>
+            <c:rich>
+              <a:bodyPr/>
+              <a:lstStyle/>
+              <a:p>
+                <a:pPr>
+                  <a:defRPr/>
+                </a:pPr>
+                <a:r>
+                  <a:rPr lang="en-US"/>
+                  <a:t>Conflict Count (Data Count = 32)</a:t>
+                </a:r>
+              </a:p>
+            </c:rich>
+          </c:tx>
+          <c:layout/>
+          <c:overlay val="0"/>
+        </c:title>
+        <c:majorTickMark val="none"/>
+        <c:minorTickMark val="none"/>
+        <c:tickLblPos val="nextTo"/>
+        <c:crossAx val="154027712"/>
+        <c:crosses val="autoZero"/>
+        <c:auto val="1"/>
+        <c:lblAlgn val="ctr"/>
+        <c:lblOffset val="100"/>
+        <c:noMultiLvlLbl val="0"/>
+      </c:catAx>
+      <c:valAx>
+        <c:axId val="154027712"/>
+        <c:scaling>
+          <c:orientation val="minMax"/>
+        </c:scaling>
+        <c:delete val="0"/>
+        <c:axPos val="l"/>
+        <c:majorGridlines/>
+        <c:title>
+          <c:tx>
+            <c:rich>
+              <a:bodyPr/>
+              <a:lstStyle/>
+              <a:p>
+                <a:pPr>
+                  <a:defRPr/>
+                </a:pPr>
+                <a:r>
+                  <a:rPr lang="en-US"/>
+                  <a:t>Network Usage (Data Objects + Hashes)</a:t>
+                </a:r>
+              </a:p>
+            </c:rich>
+          </c:tx>
+          <c:layout/>
+          <c:overlay val="0"/>
+        </c:title>
+        <c:numFmt formatCode="General" sourceLinked="1"/>
+        <c:majorTickMark val="out"/>
+        <c:minorTickMark val="none"/>
+        <c:tickLblPos val="nextTo"/>
+        <c:crossAx val="138565120"/>
+        <c:crosses val="autoZero"/>
+        <c:crossBetween val="between"/>
+      </c:valAx>
+    </c:plotArea>
+    <c:legend>
+      <c:legendPos val="r"/>
+      <c:layout/>
+      <c:overlay val="0"/>
+    </c:legend>
+    <c:plotVisOnly val="1"/>
+    <c:dispBlanksAs val="gap"/>
+    <c:showDLblsOverMax val="0"/>
+  </c:chart>
+  <c:externalData r:id="rId1">
+    <c:autoUpdate val="0"/>
+  </c:externalData>
+</c:chartSpace>
+</file>
+
+<file path=ppt/comments/comment1.xml><?xml version="1.0" encoding="utf-8"?>
+<p:cmLst xmlns:a="http://schemas.openxmlformats.org/drawingml/2006/main" xmlns:r="http://schemas.openxmlformats.org/officeDocument/2006/relationships" xmlns:p="http://schemas.openxmlformats.org/presentationml/2006/main">
+  <p:cm authorId="0" dt="2012-03-23T05:58:34.350" idx="1">
+    <p:pos x="8957" y="3687"/>
+    <p:text/>
+  </p:cm>
+</p:cmLst>
 </file>
 
 <file path=ppt/slideLayouts/slideLayout1.xml><?xml version="1.0" encoding="utf-8"?>
@@ -3108,8 +3510,8 @@
         </p:nvSpPr>
         <p:spPr>
           <a:xfrm>
-            <a:off x="4156369" y="1280319"/>
-            <a:ext cx="21954536" cy="1354217"/>
+            <a:off x="2298585" y="1280319"/>
+            <a:ext cx="26295212" cy="1569660"/>
           </a:xfrm>
           <a:prstGeom prst="rect">
             <a:avLst/>
@@ -3123,10 +3525,342 @@
           <a:lstStyle/>
           <a:p>
             <a:r>
-              <a:rPr lang="en-US" dirty="0" smtClean="0"/>
+              <a:rPr lang="en-US" sz="9600" b="1" dirty="0" smtClean="0"/>
               <a:t>Evaluating Performance of Anti-Entropy Algorithms</a:t>
             </a:r>
-            <a:endParaRPr lang="en-US" dirty="0"/>
+            <a:endParaRPr lang="en-US" sz="9600" b="1" dirty="0"/>
+          </a:p>
+        </p:txBody>
+      </p:sp>
+      <p:sp>
+        <p:nvSpPr>
+          <p:cNvPr id="2" name="TextBox 1"/>
+          <p:cNvSpPr txBox="1"/>
+          <p:nvPr/>
+        </p:nvSpPr>
+        <p:spPr>
+          <a:xfrm>
+            <a:off x="1417637" y="4023519"/>
+            <a:ext cx="5502404" cy="1354217"/>
+          </a:xfrm>
+          <a:prstGeom prst="rect">
+            <a:avLst/>
+          </a:prstGeom>
+          <a:noFill/>
+        </p:spPr>
+        <p:txBody>
+          <a:bodyPr wrap="none" rtlCol="0">
+            <a:spAutoFit/>
+          </a:bodyPr>
+          <a:lstStyle/>
+          <a:p>
+            <a:r>
+              <a:rPr lang="en-US" dirty="0"/>
+              <a:t>Introduction</a:t>
+            </a:r>
+          </a:p>
+        </p:txBody>
+      </p:sp>
+      <p:pic>
+        <p:nvPicPr>
+          <p:cNvPr id="1028" name="Picture 4"/>
+          <p:cNvPicPr>
+            <a:picLocks noChangeAspect="1" noChangeArrowheads="1"/>
+          </p:cNvPicPr>
+          <p:nvPr/>
+        </p:nvPicPr>
+        <p:blipFill>
+          <a:blip r:embed="rId2">
+            <a:extLst>
+              <a:ext uri="{28A0092B-C50C-407E-A947-70E740481C1C}">
+                <a14:useLocalDpi xmlns:a14="http://schemas.microsoft.com/office/drawing/2010/main" val="0"/>
+              </a:ext>
+            </a:extLst>
+          </a:blip>
+          <a:srcRect/>
+          <a:stretch>
+            <a:fillRect/>
+          </a:stretch>
+        </p:blipFill>
+        <p:spPr bwMode="auto">
+          <a:xfrm>
+            <a:off x="1417636" y="5852319"/>
+            <a:ext cx="9144001" cy="8849627"/>
+          </a:xfrm>
+          <a:prstGeom prst="rect">
+            <a:avLst/>
+          </a:prstGeom>
+          <a:noFill/>
+          <a:ln>
+            <a:noFill/>
+          </a:ln>
+          <a:effectLst/>
+          <a:extLst>
+            <a:ext uri="{909E8E84-426E-40DD-AFC4-6F175D3DCCD1}">
+              <a14:hiddenFill xmlns:a14="http://schemas.microsoft.com/office/drawing/2010/main">
+                <a:solidFill>
+                  <a:schemeClr val="accent1"/>
+                </a:solidFill>
+              </a14:hiddenFill>
+            </a:ext>
+            <a:ext uri="{91240B29-F687-4F45-9708-019B960494DF}">
+              <a14:hiddenLine xmlns:a14="http://schemas.microsoft.com/office/drawing/2010/main" w="9525">
+                <a:solidFill>
+                  <a:schemeClr val="tx1"/>
+                </a:solidFill>
+                <a:miter lim="800000"/>
+                <a:headEnd/>
+                <a:tailEnd/>
+              </a14:hiddenLine>
+            </a:ext>
+            <a:ext uri="{AF507438-7753-43E0-B8FC-AC1667EBCBE1}">
+              <a14:hiddenEffects xmlns:a14="http://schemas.microsoft.com/office/drawing/2010/main">
+                <a:effectLst>
+                  <a:outerShdw dist="35921" dir="2700000" algn="ctr" rotWithShape="0">
+                    <a:schemeClr val="bg2"/>
+                  </a:outerShdw>
+                </a:effectLst>
+              </a14:hiddenEffects>
+            </a:ext>
+          </a:extLst>
+        </p:spPr>
+      </p:pic>
+      <p:sp>
+        <p:nvSpPr>
+          <p:cNvPr id="9" name="TextBox 8"/>
+          <p:cNvSpPr txBox="1"/>
+          <p:nvPr/>
+        </p:nvSpPr>
+        <p:spPr>
+          <a:xfrm>
+            <a:off x="1417637" y="15910560"/>
+            <a:ext cx="5569217" cy="1354217"/>
+          </a:xfrm>
+          <a:prstGeom prst="rect">
+            <a:avLst/>
+          </a:prstGeom>
+          <a:noFill/>
+        </p:spPr>
+        <p:txBody>
+          <a:bodyPr wrap="none" rtlCol="0">
+            <a:spAutoFit/>
+          </a:bodyPr>
+          <a:lstStyle/>
+          <a:p>
+            <a:r>
+              <a:rPr lang="en-US" dirty="0"/>
+              <a:t>Visualization</a:t>
+            </a:r>
+          </a:p>
+        </p:txBody>
+      </p:sp>
+      <p:pic>
+        <p:nvPicPr>
+          <p:cNvPr id="1031" name="Picture 7" descr="C:\Users\kennygao\code\thesis\AntiEntropy\poster\visualization.png"/>
+          <p:cNvPicPr>
+            <a:picLocks noChangeAspect="1" noChangeArrowheads="1"/>
+          </p:cNvPicPr>
+          <p:nvPr/>
+        </p:nvPicPr>
+        <p:blipFill>
+          <a:blip r:embed="rId3">
+            <a:extLst>
+              <a:ext uri="{28A0092B-C50C-407E-A947-70E740481C1C}">
+                <a14:useLocalDpi xmlns:a14="http://schemas.microsoft.com/office/drawing/2010/main" val="0"/>
+              </a:ext>
+            </a:extLst>
+          </a:blip>
+          <a:srcRect/>
+          <a:stretch>
+            <a:fillRect/>
+          </a:stretch>
+        </p:blipFill>
+        <p:spPr bwMode="auto">
+          <a:xfrm>
+            <a:off x="1417636" y="17739360"/>
+            <a:ext cx="9583738" cy="7412038"/>
+          </a:xfrm>
+          <a:prstGeom prst="rect">
+            <a:avLst/>
+          </a:prstGeom>
+          <a:noFill/>
+          <a:extLst>
+            <a:ext uri="{909E8E84-426E-40DD-AFC4-6F175D3DCCD1}">
+              <a14:hiddenFill xmlns:a14="http://schemas.microsoft.com/office/drawing/2010/main">
+                <a:solidFill>
+                  <a:srgbClr val="FFFFFF"/>
+                </a:solidFill>
+              </a14:hiddenFill>
+            </a:ext>
+          </a:extLst>
+        </p:spPr>
+      </p:pic>
+      <p:sp>
+        <p:nvSpPr>
+          <p:cNvPr id="11" name="TextBox 10"/>
+          <p:cNvSpPr txBox="1"/>
+          <p:nvPr/>
+        </p:nvSpPr>
+        <p:spPr>
+          <a:xfrm>
+            <a:off x="1417636" y="25969119"/>
+            <a:ext cx="4888389" cy="1354217"/>
+          </a:xfrm>
+          <a:prstGeom prst="rect">
+            <a:avLst/>
+          </a:prstGeom>
+          <a:noFill/>
+        </p:spPr>
+        <p:txBody>
+          <a:bodyPr wrap="none" rtlCol="0">
+            <a:spAutoFit/>
+          </a:bodyPr>
+          <a:lstStyle/>
+          <a:p>
+            <a:r>
+              <a:rPr lang="en-US" dirty="0"/>
+              <a:t>Motivation</a:t>
+            </a:r>
+          </a:p>
+        </p:txBody>
+      </p:sp>
+      <p:sp>
+        <p:nvSpPr>
+          <p:cNvPr id="12" name="TextBox 11"/>
+          <p:cNvSpPr txBox="1"/>
+          <p:nvPr/>
+        </p:nvSpPr>
+        <p:spPr>
+          <a:xfrm>
+            <a:off x="1417634" y="34198719"/>
+            <a:ext cx="13252795" cy="1354217"/>
+          </a:xfrm>
+          <a:prstGeom prst="rect">
+            <a:avLst/>
+          </a:prstGeom>
+          <a:noFill/>
+        </p:spPr>
+        <p:txBody>
+          <a:bodyPr wrap="none" rtlCol="0">
+            <a:spAutoFit/>
+          </a:bodyPr>
+          <a:lstStyle/>
+          <a:p>
+            <a:r>
+              <a:rPr lang="en-US" dirty="0"/>
+              <a:t>Approach and Implementation</a:t>
+            </a:r>
+          </a:p>
+        </p:txBody>
+      </p:sp>
+      <p:sp>
+        <p:nvSpPr>
+          <p:cNvPr id="13" name="TextBox 12"/>
+          <p:cNvSpPr txBox="1"/>
+          <p:nvPr/>
+        </p:nvSpPr>
+        <p:spPr>
+          <a:xfrm>
+            <a:off x="16048037" y="4023519"/>
+            <a:ext cx="3231141" cy="1354217"/>
+          </a:xfrm>
+          <a:prstGeom prst="rect">
+            <a:avLst/>
+          </a:prstGeom>
+          <a:noFill/>
+        </p:spPr>
+        <p:txBody>
+          <a:bodyPr wrap="none" rtlCol="0">
+            <a:spAutoFit/>
+          </a:bodyPr>
+          <a:lstStyle/>
+          <a:p>
+            <a:r>
+              <a:rPr lang="en-US" dirty="0"/>
+              <a:t>Results</a:t>
+            </a:r>
+          </a:p>
+        </p:txBody>
+      </p:sp>
+      <p:graphicFrame>
+        <p:nvGraphicFramePr>
+          <p:cNvPr id="14" name="Chart 13"/>
+          <p:cNvGraphicFramePr>
+            <a:graphicFrameLocks/>
+          </p:cNvGraphicFramePr>
+          <p:nvPr>
+            <p:extLst>
+              <p:ext uri="{D42A27DB-BD31-4B8C-83A1-F6EECF244321}">
+                <p14:modId xmlns:p14="http://schemas.microsoft.com/office/powerpoint/2010/main" val="1777205005"/>
+              </p:ext>
+            </p:extLst>
+          </p:nvPr>
+        </p:nvGraphicFramePr>
+        <p:xfrm>
+          <a:off x="16048037" y="5852319"/>
+          <a:ext cx="12801600" cy="7696200"/>
+        </p:xfrm>
+        <a:graphic>
+          <a:graphicData uri="http://schemas.openxmlformats.org/drawingml/2006/chart">
+            <c:chart xmlns:c="http://schemas.openxmlformats.org/drawingml/2006/chart" xmlns:r="http://schemas.openxmlformats.org/officeDocument/2006/relationships" r:id="rId4"/>
+          </a:graphicData>
+        </a:graphic>
+      </p:graphicFrame>
+      <p:sp>
+        <p:nvSpPr>
+          <p:cNvPr id="15" name="TextBox 14"/>
+          <p:cNvSpPr txBox="1"/>
+          <p:nvPr/>
+        </p:nvSpPr>
+        <p:spPr>
+          <a:xfrm>
+            <a:off x="16048037" y="25969119"/>
+            <a:ext cx="12467580" cy="1354217"/>
+          </a:xfrm>
+          <a:prstGeom prst="rect">
+            <a:avLst/>
+          </a:prstGeom>
+          <a:noFill/>
+        </p:spPr>
+        <p:txBody>
+          <a:bodyPr wrap="none" rtlCol="0">
+            <a:spAutoFit/>
+          </a:bodyPr>
+          <a:lstStyle/>
+          <a:p>
+            <a:r>
+              <a:rPr lang="en-US" dirty="0"/>
+              <a:t>Discussion and Further Work</a:t>
+            </a:r>
+          </a:p>
+        </p:txBody>
+      </p:sp>
+      <p:sp>
+        <p:nvSpPr>
+          <p:cNvPr id="16" name="TextBox 15"/>
+          <p:cNvSpPr txBox="1"/>
+          <p:nvPr/>
+        </p:nvSpPr>
+        <p:spPr>
+          <a:xfrm>
+            <a:off x="16048035" y="34198719"/>
+            <a:ext cx="5266185" cy="1354217"/>
+          </a:xfrm>
+          <a:prstGeom prst="rect">
+            <a:avLst/>
+          </a:prstGeom>
+          <a:noFill/>
+        </p:spPr>
+        <p:txBody>
+          <a:bodyPr wrap="none" rtlCol="0">
+            <a:spAutoFit/>
+          </a:bodyPr>
+          <a:lstStyle/>
+          <a:p>
+            <a:r>
+              <a:rPr lang="en-US" dirty="0"/>
+              <a:t>Conclusions</a:t>
+            </a:r>
           </a:p>
         </p:txBody>
       </p:sp>

</xml_diff>